<commit_message>
pres. for 4 with some slides
</commit_message>
<xml_diff>
--- a/docs/02_ng_basics_followup.pptx
+++ b/docs/02_ng_basics_followup.pptx
@@ -5,7 +5,7 @@
     <p:sldMasterId id="2147483648" r:id="rId1"/>
   </p:sldMasterIdLst>
   <p:notesMasterIdLst>
-    <p:notesMasterId r:id="rId17"/>
+    <p:notesMasterId r:id="rId16"/>
   </p:notesMasterIdLst>
   <p:sldIdLst>
     <p:sldId id="256" r:id="rId2"/>
@@ -22,7 +22,6 @@
     <p:sldId id="274" r:id="rId13"/>
     <p:sldId id="277" r:id="rId14"/>
     <p:sldId id="280" r:id="rId15"/>
-    <p:sldId id="281" r:id="rId16"/>
   </p:sldIdLst>
   <p:sldSz cx="9144000" cy="6858000" type="screen4x3"/>
   <p:notesSz cx="6858000" cy="9144000"/>
@@ -123,7 +122,7 @@
   </p:defaultTextStyle>
   <p:extLst>
     <p:ext uri="{EFAFB233-063F-42B5-8137-9DF3F51BA10A}">
-      <p15:sldGuideLst xmlns:p15="http://schemas.microsoft.com/office/powerpoint/2012/main" xmlns="">
+      <p15:sldGuideLst xmlns="" xmlns:p15="http://schemas.microsoft.com/office/powerpoint/2012/main">
         <p15:guide id="1" orient="horz" pos="2160">
           <p15:clr>
             <a:srgbClr val="A4A3A4"/>
@@ -753,94 +752,6 @@
     <p:extLst>
       <p:ext uri="{BB962C8B-B14F-4D97-AF65-F5344CB8AC3E}">
         <p14:creationId xmlns:p14="http://schemas.microsoft.com/office/powerpoint/2010/main" val="3373412012"/>
-      </p:ext>
-    </p:extLst>
-  </p:cSld>
-  <p:clrMapOvr>
-    <a:masterClrMapping/>
-  </p:clrMapOvr>
-</p:notes>
-</file>
-
-<file path=ppt/notesSlides/notesSlide12.xml><?xml version="1.0" encoding="utf-8"?>
-<p:notes xmlns:a="http://schemas.openxmlformats.org/drawingml/2006/main" xmlns:r="http://schemas.openxmlformats.org/officeDocument/2006/relationships" xmlns:p="http://schemas.openxmlformats.org/presentationml/2006/main">
-  <p:cSld>
-    <p:spTree>
-      <p:nvGrpSpPr>
-        <p:cNvPr id="1" name=""/>
-        <p:cNvGrpSpPr/>
-        <p:nvPr/>
-      </p:nvGrpSpPr>
-      <p:grpSpPr>
-        <a:xfrm>
-          <a:off x="0" y="0"/>
-          <a:ext cx="0" cy="0"/>
-          <a:chOff x="0" y="0"/>
-          <a:chExt cx="0" cy="0"/>
-        </a:xfrm>
-      </p:grpSpPr>
-      <p:sp>
-        <p:nvSpPr>
-          <p:cNvPr id="2" name="Slide Image Placeholder 1"/>
-          <p:cNvSpPr>
-            <a:spLocks noGrp="1" noRot="1" noChangeAspect="1"/>
-          </p:cNvSpPr>
-          <p:nvPr>
-            <p:ph type="sldImg"/>
-          </p:nvPr>
-        </p:nvSpPr>
-        <p:spPr/>
-      </p:sp>
-      <p:sp>
-        <p:nvSpPr>
-          <p:cNvPr id="3" name="Notes Placeholder 2"/>
-          <p:cNvSpPr>
-            <a:spLocks noGrp="1"/>
-          </p:cNvSpPr>
-          <p:nvPr>
-            <p:ph type="body" idx="1"/>
-          </p:nvPr>
-        </p:nvSpPr>
-        <p:spPr/>
-        <p:txBody>
-          <a:bodyPr/>
-          <a:lstStyle/>
-          <a:p>
-            <a:r>
-              <a:rPr lang="en-US" dirty="0" smtClean="0"/>
-              <a:t>https://docs.angularjs.org/guide</a:t>
-            </a:r>
-            <a:endParaRPr lang="ru-RU" dirty="0"/>
-          </a:p>
-        </p:txBody>
-      </p:sp>
-      <p:sp>
-        <p:nvSpPr>
-          <p:cNvPr id="4" name="Slide Number Placeholder 3"/>
-          <p:cNvSpPr>
-            <a:spLocks noGrp="1"/>
-          </p:cNvSpPr>
-          <p:nvPr>
-            <p:ph type="sldNum" sz="quarter" idx="10"/>
-          </p:nvPr>
-        </p:nvSpPr>
-        <p:spPr/>
-        <p:txBody>
-          <a:bodyPr/>
-          <a:lstStyle/>
-          <a:p>
-            <a:fld id="{DA8CAE91-5FC7-41E5-8054-44424FFBB7AB}" type="slidenum">
-              <a:rPr lang="ru-RU" smtClean="0"/>
-              <a:t>15</a:t>
-            </a:fld>
-            <a:endParaRPr lang="ru-RU"/>
-          </a:p>
-        </p:txBody>
-      </p:sp>
-    </p:spTree>
-    <p:extLst>
-      <p:ext uri="{BB962C8B-B14F-4D97-AF65-F5344CB8AC3E}">
-        <p14:creationId xmlns:p14="http://schemas.microsoft.com/office/powerpoint/2010/main" val="3191455273"/>
       </p:ext>
     </p:extLst>
   </p:cSld>
@@ -6530,189 +6441,6 @@
     </p:tnLst>
     <p:bldLst>
       <p:bldP spid="4" grpId="0"/>
-    </p:bldLst>
-  </p:timing>
-</p:sld>
-</file>
-
-<file path=ppt/slides/slide15.xml><?xml version="1.0" encoding="utf-8"?>
-<p:sld xmlns:a="http://schemas.openxmlformats.org/drawingml/2006/main" xmlns:r="http://schemas.openxmlformats.org/officeDocument/2006/relationships" xmlns:p="http://schemas.openxmlformats.org/presentationml/2006/main">
-  <p:cSld>
-    <p:spTree>
-      <p:nvGrpSpPr>
-        <p:cNvPr id="1" name=""/>
-        <p:cNvGrpSpPr/>
-        <p:nvPr/>
-      </p:nvGrpSpPr>
-      <p:grpSpPr>
-        <a:xfrm>
-          <a:off x="0" y="0"/>
-          <a:ext cx="0" cy="0"/>
-          <a:chOff x="0" y="0"/>
-          <a:chExt cx="0" cy="0"/>
-        </a:xfrm>
-      </p:grpSpPr>
-      <p:sp>
-        <p:nvSpPr>
-          <p:cNvPr id="2" name="Title 1"/>
-          <p:cNvSpPr>
-            <a:spLocks noGrp="1"/>
-          </p:cNvSpPr>
-          <p:nvPr>
-            <p:ph type="title"/>
-          </p:nvPr>
-        </p:nvSpPr>
-        <p:spPr>
-          <a:xfrm>
-            <a:off x="533400" y="1981200"/>
-            <a:ext cx="8229600" cy="1143000"/>
-          </a:xfrm>
-        </p:spPr>
-        <p:txBody>
-          <a:bodyPr>
-            <a:normAutofit/>
-          </a:bodyPr>
-          <a:lstStyle/>
-          <a:p>
-            <a:r>
-              <a:rPr lang="en-US" dirty="0" smtClean="0">
-                <a:latin typeface="Courier New" panose="02070309020205020404" pitchFamily="49" charset="0"/>
-                <a:cs typeface="Courier New" panose="02070309020205020404" pitchFamily="49" charset="0"/>
-              </a:rPr>
-              <a:t>Homework!</a:t>
-            </a:r>
-            <a:endParaRPr lang="ru-RU" dirty="0">
-              <a:latin typeface="Courier New" panose="02070309020205020404" pitchFamily="49" charset="0"/>
-              <a:cs typeface="Courier New" panose="02070309020205020404" pitchFamily="49" charset="0"/>
-            </a:endParaRPr>
-          </a:p>
-        </p:txBody>
-      </p:sp>
-      <p:sp>
-        <p:nvSpPr>
-          <p:cNvPr id="3" name="Rectangle 2"/>
-          <p:cNvSpPr/>
-          <p:nvPr/>
-        </p:nvSpPr>
-        <p:spPr>
-          <a:xfrm>
-            <a:off x="2925189" y="3200400"/>
-            <a:ext cx="3228128" cy="369332"/>
-          </a:xfrm>
-          <a:prstGeom prst="rect">
-            <a:avLst/>
-          </a:prstGeom>
-        </p:spPr>
-        <p:txBody>
-          <a:bodyPr wrap="none">
-            <a:spAutoFit/>
-          </a:bodyPr>
-          <a:lstStyle/>
-          <a:p>
-            <a:r>
-              <a:rPr lang="en-US" dirty="0">
-                <a:hlinkClick r:id="rId3"/>
-              </a:rPr>
-              <a:t>https://docs.angularjs.org/guide</a:t>
-            </a:r>
-            <a:endParaRPr lang="ru-RU" dirty="0"/>
-          </a:p>
-        </p:txBody>
-      </p:sp>
-    </p:spTree>
-    <p:extLst>
-      <p:ext uri="{BB962C8B-B14F-4D97-AF65-F5344CB8AC3E}">
-        <p14:creationId xmlns:p14="http://schemas.microsoft.com/office/powerpoint/2010/main" val="2954431745"/>
-      </p:ext>
-    </p:extLst>
-  </p:cSld>
-  <p:clrMapOvr>
-    <a:masterClrMapping/>
-  </p:clrMapOvr>
-  <mc:AlternateContent xmlns:mc="http://schemas.openxmlformats.org/markup-compatibility/2006" xmlns:p14="http://schemas.microsoft.com/office/powerpoint/2010/main">
-    <mc:Choice Requires="p14">
-      <p:transition spd="slow" p14:dur="2000"/>
-    </mc:Choice>
-    <mc:Fallback xmlns="">
-      <p:transition spd="slow"/>
-    </mc:Fallback>
-  </mc:AlternateContent>
-  <p:timing>
-    <p:tnLst>
-      <p:par>
-        <p:cTn id="1" dur="indefinite" restart="never" nodeType="tmRoot">
-          <p:childTnLst>
-            <p:seq concurrent="1" nextAc="seek">
-              <p:cTn id="2" dur="indefinite" nodeType="mainSeq">
-                <p:childTnLst>
-                  <p:par>
-                    <p:cTn id="3" fill="hold">
-                      <p:stCondLst>
-                        <p:cond delay="indefinite"/>
-                      </p:stCondLst>
-                      <p:childTnLst>
-                        <p:par>
-                          <p:cTn id="4" fill="hold">
-                            <p:stCondLst>
-                              <p:cond delay="0"/>
-                            </p:stCondLst>
-                            <p:childTnLst>
-                              <p:par>
-                                <p:cTn id="5" presetID="1" presetClass="entr" presetSubtype="0" fill="hold" grpId="0" nodeType="clickEffect">
-                                  <p:stCondLst>
-                                    <p:cond delay="0"/>
-                                  </p:stCondLst>
-                                  <p:childTnLst>
-                                    <p:set>
-                                      <p:cBhvr>
-                                        <p:cTn id="6" dur="1" fill="hold">
-                                          <p:stCondLst>
-                                            <p:cond delay="0"/>
-                                          </p:stCondLst>
-                                        </p:cTn>
-                                        <p:tgtEl>
-                                          <p:spTgt spid="3"/>
-                                        </p:tgtEl>
-                                        <p:attrNameLst>
-                                          <p:attrName>style.visibility</p:attrName>
-                                        </p:attrNameLst>
-                                      </p:cBhvr>
-                                      <p:to>
-                                        <p:strVal val="visible"/>
-                                      </p:to>
-                                    </p:set>
-                                  </p:childTnLst>
-                                </p:cTn>
-                              </p:par>
-                            </p:childTnLst>
-                          </p:cTn>
-                        </p:par>
-                      </p:childTnLst>
-                    </p:cTn>
-                  </p:par>
-                </p:childTnLst>
-              </p:cTn>
-              <p:prevCondLst>
-                <p:cond evt="onPrev" delay="0">
-                  <p:tgtEl>
-                    <p:sldTgt/>
-                  </p:tgtEl>
-                </p:cond>
-              </p:prevCondLst>
-              <p:nextCondLst>
-                <p:cond evt="onNext" delay="0">
-                  <p:tgtEl>
-                    <p:sldTgt/>
-                  </p:tgtEl>
-                </p:cond>
-              </p:nextCondLst>
-            </p:seq>
-          </p:childTnLst>
-        </p:cTn>
-      </p:par>
-    </p:tnLst>
-    <p:bldLst>
-      <p:bldP spid="3" grpId="0"/>
     </p:bldLst>
   </p:timing>
 </p:sld>

</xml_diff>